<commit_message>
remove exercise from slide
</commit_message>
<xml_diff>
--- a/12 $resource/$ressource.pptx
+++ b/12 $resource/$ressource.pptx
@@ -5,10 +5,10 @@
     <p:sldMasterId id="2147483648" r:id="rId1"/>
   </p:sldMasterIdLst>
   <p:notesMasterIdLst>
-    <p:notesMasterId r:id="rId12"/>
+    <p:notesMasterId r:id="rId11"/>
   </p:notesMasterIdLst>
   <p:handoutMasterIdLst>
-    <p:handoutMasterId r:id="rId13"/>
+    <p:handoutMasterId r:id="rId12"/>
   </p:handoutMasterIdLst>
   <p:sldIdLst>
     <p:sldId id="410" r:id="rId2"/>
@@ -20,7 +20,6 @@
     <p:sldId id="412" r:id="rId8"/>
     <p:sldId id="413" r:id="rId9"/>
     <p:sldId id="414" r:id="rId10"/>
-    <p:sldId id="415" r:id="rId11"/>
   </p:sldIdLst>
   <p:sldSz cx="9144000" cy="6858000" type="screen4x3"/>
   <p:notesSz cx="7104063" cy="10234613"/>
@@ -291,7 +290,7 @@
             <a:fld id="{87731427-D242-475D-9180-8940013A50B8}" type="datetimeFigureOut">
               <a:rPr lang="en-GB" smtClean="0"/>
               <a:pPr algn="l"/>
-              <a:t>21/11/2016</a:t>
+              <a:t>16/03/2017</a:t>
             </a:fld>
             <a:endParaRPr lang="en-GB" dirty="0"/>
           </a:p>
@@ -496,7 +495,7 @@
             <a:fld id="{BA521D56-F1F4-41A0-82EB-989F4F6F400D}" type="datetimeFigureOut">
               <a:rPr lang="fr-FR" smtClean="0"/>
               <a:pPr/>
-              <a:t>21/11/2016</a:t>
+              <a:t>16/03/2017</a:t>
             </a:fld>
             <a:endParaRPr lang="fr-FR"/>
           </a:p>
@@ -1024,7 +1023,7 @@
             <a:fld id="{973B10A7-8A2B-4F39-8160-83B51E5E9C07}" type="datetime1">
               <a:rPr lang="fr-FR" smtClean="0"/>
               <a:pPr/>
-              <a:t>21/11/2016</a:t>
+              <a:t>16/03/2017</a:t>
             </a:fld>
             <a:endParaRPr lang="fr-FR"/>
           </a:p>
@@ -1160,7 +1159,7 @@
             <a:fld id="{973B10A7-8A2B-4F39-8160-83B51E5E9C07}" type="datetime1">
               <a:rPr lang="fr-FR" smtClean="0"/>
               <a:pPr/>
-              <a:t>21/11/2016</a:t>
+              <a:t>16/03/2017</a:t>
             </a:fld>
             <a:endParaRPr lang="fr-FR"/>
           </a:p>
@@ -1296,7 +1295,7 @@
             <a:fld id="{973B10A7-8A2B-4F39-8160-83B51E5E9C07}" type="datetime1">
               <a:rPr lang="fr-FR" smtClean="0"/>
               <a:pPr/>
-              <a:t>21/11/2016</a:t>
+              <a:t>16/03/2017</a:t>
             </a:fld>
             <a:endParaRPr lang="fr-FR"/>
           </a:p>
@@ -1432,7 +1431,7 @@
             <a:fld id="{973B10A7-8A2B-4F39-8160-83B51E5E9C07}" type="datetime1">
               <a:rPr lang="fr-FR" smtClean="0"/>
               <a:pPr/>
-              <a:t>21/11/2016</a:t>
+              <a:t>16/03/2017</a:t>
             </a:fld>
             <a:endParaRPr lang="fr-FR"/>
           </a:p>
@@ -1568,7 +1567,7 @@
             <a:fld id="{973B10A7-8A2B-4F39-8160-83B51E5E9C07}" type="datetime1">
               <a:rPr lang="fr-FR" smtClean="0"/>
               <a:pPr/>
-              <a:t>21/11/2016</a:t>
+              <a:t>16/03/2017</a:t>
             </a:fld>
             <a:endParaRPr lang="fr-FR"/>
           </a:p>
@@ -1704,7 +1703,7 @@
             <a:fld id="{973B10A7-8A2B-4F39-8160-83B51E5E9C07}" type="datetime1">
               <a:rPr lang="fr-FR" smtClean="0"/>
               <a:pPr/>
-              <a:t>21/11/2016</a:t>
+              <a:t>16/03/2017</a:t>
             </a:fld>
             <a:endParaRPr lang="fr-FR"/>
           </a:p>
@@ -1840,7 +1839,7 @@
             <a:fld id="{973B10A7-8A2B-4F39-8160-83B51E5E9C07}" type="datetime1">
               <a:rPr lang="fr-FR" smtClean="0"/>
               <a:pPr/>
-              <a:t>21/11/2016</a:t>
+              <a:t>16/03/2017</a:t>
             </a:fld>
             <a:endParaRPr lang="fr-FR"/>
           </a:p>
@@ -1976,7 +1975,7 @@
             <a:fld id="{973B10A7-8A2B-4F39-8160-83B51E5E9C07}" type="datetime1">
               <a:rPr lang="fr-FR" smtClean="0"/>
               <a:pPr/>
-              <a:t>21/11/2016</a:t>
+              <a:t>16/03/2017</a:t>
             </a:fld>
             <a:endParaRPr lang="fr-FR"/>
           </a:p>
@@ -1986,142 +1985,6 @@
     <p:extLst>
       <p:ext uri="{BB962C8B-B14F-4D97-AF65-F5344CB8AC3E}">
         <p14:creationId xmlns:p14="http://schemas.microsoft.com/office/powerpoint/2010/main" val="2857979204"/>
-      </p:ext>
-    </p:extLst>
-  </p:cSld>
-  <p:clrMapOvr>
-    <a:masterClrMapping/>
-  </p:clrMapOvr>
-</p:notes>
-</file>
-
-<file path=ppt/notesSlides/notesSlide9.xml><?xml version="1.0" encoding="utf-8"?>
-<p:notes xmlns:a="http://schemas.openxmlformats.org/drawingml/2006/main" xmlns:r="http://schemas.openxmlformats.org/officeDocument/2006/relationships" xmlns:p="http://schemas.openxmlformats.org/presentationml/2006/main">
-  <p:cSld>
-    <p:spTree>
-      <p:nvGrpSpPr>
-        <p:cNvPr id="1" name=""/>
-        <p:cNvGrpSpPr/>
-        <p:nvPr/>
-      </p:nvGrpSpPr>
-      <p:grpSpPr>
-        <a:xfrm>
-          <a:off x="0" y="0"/>
-          <a:ext cx="0" cy="0"/>
-          <a:chOff x="0" y="0"/>
-          <a:chExt cx="0" cy="0"/>
-        </a:xfrm>
-      </p:grpSpPr>
-      <p:sp>
-        <p:nvSpPr>
-          <p:cNvPr id="10" name="Espace réservé de l'image des diapositives 9"/>
-          <p:cNvSpPr>
-            <a:spLocks noGrp="1" noRot="1" noChangeAspect="1"/>
-          </p:cNvSpPr>
-          <p:nvPr>
-            <p:ph type="sldImg"/>
-          </p:nvPr>
-        </p:nvSpPr>
-        <p:spPr/>
-      </p:sp>
-      <p:sp>
-        <p:nvSpPr>
-          <p:cNvPr id="11" name="Espace réservé des commentaires 10"/>
-          <p:cNvSpPr>
-            <a:spLocks noGrp="1"/>
-          </p:cNvSpPr>
-          <p:nvPr>
-            <p:ph type="body" idx="1"/>
-          </p:nvPr>
-        </p:nvSpPr>
-        <p:spPr/>
-        <p:txBody>
-          <a:bodyPr/>
-          <a:lstStyle/>
-          <a:p>
-            <a:endParaRPr lang="fr-FR"/>
-          </a:p>
-        </p:txBody>
-      </p:sp>
-      <p:sp>
-        <p:nvSpPr>
-          <p:cNvPr id="14" name="Espace réservé du pied de page 13"/>
-          <p:cNvSpPr>
-            <a:spLocks noGrp="1"/>
-          </p:cNvSpPr>
-          <p:nvPr>
-            <p:ph type="ftr" sz="quarter" idx="12"/>
-          </p:nvPr>
-        </p:nvSpPr>
-        <p:spPr/>
-        <p:txBody>
-          <a:bodyPr/>
-          <a:lstStyle/>
-          <a:p>
-            <a:r>
-              <a:rPr lang="en-GB" sz="1100" dirty="0"/>
-              <a:t>Titre de la </a:t>
-            </a:r>
-            <a:r>
-              <a:rPr lang="en-GB" sz="1100" dirty="0" err="1"/>
-              <a:t>présentation</a:t>
-            </a:r>
-            <a:endParaRPr lang="en-GB" sz="1100" dirty="0"/>
-          </a:p>
-        </p:txBody>
-      </p:sp>
-      <p:sp>
-        <p:nvSpPr>
-          <p:cNvPr id="15" name="Espace réservé du numéro de diapositive 14"/>
-          <p:cNvSpPr>
-            <a:spLocks noGrp="1"/>
-          </p:cNvSpPr>
-          <p:nvPr>
-            <p:ph type="sldNum" sz="quarter" idx="13"/>
-          </p:nvPr>
-        </p:nvSpPr>
-        <p:spPr/>
-        <p:txBody>
-          <a:bodyPr/>
-          <a:lstStyle/>
-          <a:p>
-            <a:fld id="{305287CA-3E72-4A91-B59B-B69F40801570}" type="slidenum">
-              <a:rPr lang="en-GB" sz="1100" smtClean="0"/>
-              <a:pPr/>
-              <a:t>10</a:t>
-            </a:fld>
-            <a:endParaRPr lang="en-GB" sz="1100" dirty="0"/>
-          </a:p>
-        </p:txBody>
-      </p:sp>
-      <p:sp>
-        <p:nvSpPr>
-          <p:cNvPr id="2" name="Espace réservé de la date 1"/>
-          <p:cNvSpPr>
-            <a:spLocks noGrp="1"/>
-          </p:cNvSpPr>
-          <p:nvPr>
-            <p:ph type="dt" idx="14"/>
-          </p:nvPr>
-        </p:nvSpPr>
-        <p:spPr/>
-        <p:txBody>
-          <a:bodyPr/>
-          <a:lstStyle/>
-          <a:p>
-            <a:fld id="{973B10A7-8A2B-4F39-8160-83B51E5E9C07}" type="datetime1">
-              <a:rPr lang="fr-FR" smtClean="0"/>
-              <a:pPr/>
-              <a:t>21/11/2016</a:t>
-            </a:fld>
-            <a:endParaRPr lang="fr-FR"/>
-          </a:p>
-        </p:txBody>
-      </p:sp>
-    </p:spTree>
-    <p:extLst>
-      <p:ext uri="{BB962C8B-B14F-4D97-AF65-F5344CB8AC3E}">
-        <p14:creationId xmlns:p14="http://schemas.microsoft.com/office/powerpoint/2010/main" val="776022529"/>
       </p:ext>
     </p:extLst>
   </p:cSld>
@@ -9979,356 +9842,6 @@
 </p:sld>
 </file>
 
-<file path=ppt/slides/slide10.xml><?xml version="1.0" encoding="utf-8"?>
-<p:sld xmlns:a="http://schemas.openxmlformats.org/drawingml/2006/main" xmlns:r="http://schemas.openxmlformats.org/officeDocument/2006/relationships" xmlns:p="http://schemas.openxmlformats.org/presentationml/2006/main">
-  <p:cSld>
-    <p:spTree>
-      <p:nvGrpSpPr>
-        <p:cNvPr id="1" name=""/>
-        <p:cNvGrpSpPr/>
-        <p:nvPr/>
-      </p:nvGrpSpPr>
-      <p:grpSpPr>
-        <a:xfrm>
-          <a:off x="0" y="0"/>
-          <a:ext cx="0" cy="0"/>
-          <a:chOff x="0" y="0"/>
-          <a:chExt cx="0" cy="0"/>
-        </a:xfrm>
-      </p:grpSpPr>
-      <p:sp>
-        <p:nvSpPr>
-          <p:cNvPr id="2" name="Espace réservé du contenu 1"/>
-          <p:cNvSpPr>
-            <a:spLocks noGrp="1"/>
-          </p:cNvSpPr>
-          <p:nvPr>
-            <p:ph idx="1"/>
-          </p:nvPr>
-        </p:nvSpPr>
-        <p:spPr bwMode="gray">
-          <a:xfrm>
-            <a:off x="468313" y="1131887"/>
-            <a:ext cx="8518669" cy="4681537"/>
-          </a:xfrm>
-        </p:spPr>
-        <p:txBody>
-          <a:bodyPr/>
-          <a:lstStyle/>
-          <a:p>
-            <a:r>
-              <a:rPr lang="fr-FR" sz="1800" dirty="0"/>
-              <a:t>Le but du TP est d'utiliser le service </a:t>
-            </a:r>
-            <a:r>
-              <a:rPr lang="fr-FR" sz="1600" dirty="0"/>
-              <a:t>$</a:t>
-            </a:r>
-            <a:r>
-              <a:rPr lang="fr-FR" sz="1600" dirty="0" err="1"/>
-              <a:t>resource</a:t>
-            </a:r>
-            <a:r>
-              <a:rPr lang="fr-FR" sz="1800" dirty="0"/>
-              <a:t> pour faire </a:t>
-            </a:r>
-            <a:r>
-              <a:rPr lang="fr-FR" sz="1800" dirty="0" err="1"/>
-              <a:t>interagire</a:t>
-            </a:r>
-            <a:r>
-              <a:rPr lang="fr-FR" sz="1800" dirty="0"/>
-              <a:t> l'application avec le </a:t>
-            </a:r>
-            <a:r>
-              <a:rPr lang="fr-FR" sz="1800" dirty="0" err="1"/>
-              <a:t>backend</a:t>
-            </a:r>
-            <a:endParaRPr lang="fr-FR" sz="1200" dirty="0"/>
-          </a:p>
-          <a:p>
-            <a:r>
-              <a:rPr lang="fr-FR" sz="1800" b="1" dirty="0"/>
-              <a:t>Instructions</a:t>
-            </a:r>
-            <a:endParaRPr lang="fr-FR" sz="1000" dirty="0"/>
-          </a:p>
-          <a:p>
-            <a:pPr lvl="0"/>
-            <a:r>
-              <a:rPr lang="fr-FR" sz="1800" dirty="0"/>
-              <a:t>Importer le module </a:t>
-            </a:r>
-            <a:r>
-              <a:rPr lang="fr-FR" sz="1600" dirty="0" err="1"/>
-              <a:t>angular-resource</a:t>
-            </a:r>
-            <a:r>
-              <a:rPr lang="fr-FR" sz="1800" dirty="0"/>
-              <a:t> :</a:t>
-            </a:r>
-            <a:endParaRPr lang="fr-FR" sz="1200" dirty="0"/>
-          </a:p>
-          <a:p>
-            <a:pPr lvl="1"/>
-            <a:r>
-              <a:rPr lang="fr-FR" dirty="0"/>
-              <a:t>Embarquer </a:t>
-            </a:r>
-            <a:r>
-              <a:rPr lang="fr-FR" sz="1600" dirty="0" err="1"/>
-              <a:t>bower_components</a:t>
-            </a:r>
-            <a:r>
-              <a:rPr lang="fr-FR" sz="1600" dirty="0"/>
-              <a:t>/</a:t>
-            </a:r>
-            <a:r>
-              <a:rPr lang="fr-FR" sz="1600" dirty="0" err="1"/>
-              <a:t>angular-resource</a:t>
-            </a:r>
-            <a:r>
-              <a:rPr lang="fr-FR" sz="1600" dirty="0"/>
-              <a:t>/angular-resource.js</a:t>
-            </a:r>
-            <a:r>
-              <a:rPr lang="fr-FR" dirty="0"/>
-              <a:t> dans l'</a:t>
-            </a:r>
-            <a:r>
-              <a:rPr lang="fr-FR" sz="1600" dirty="0"/>
-              <a:t>index.html</a:t>
-            </a:r>
-            <a:endParaRPr lang="fr-FR" sz="1200" dirty="0"/>
-          </a:p>
-          <a:p>
-            <a:pPr lvl="1"/>
-            <a:r>
-              <a:rPr lang="fr-FR" sz="1600" dirty="0"/>
-              <a:t>Injecter le module </a:t>
-            </a:r>
-            <a:r>
-              <a:rPr lang="fr-FR" sz="1400" dirty="0" err="1"/>
-              <a:t>ngResource</a:t>
-            </a:r>
-            <a:r>
-              <a:rPr lang="fr-FR" sz="1600" dirty="0"/>
-              <a:t> dans l'application</a:t>
-            </a:r>
-            <a:endParaRPr lang="fr-FR" sz="1100" dirty="0"/>
-          </a:p>
-          <a:p>
-            <a:pPr lvl="0"/>
-            <a:r>
-              <a:rPr lang="fr-FR" sz="1800" dirty="0"/>
-              <a:t>Déclarer une </a:t>
-            </a:r>
-            <a:r>
-              <a:rPr lang="fr-FR" sz="1800" dirty="0" err="1"/>
-              <a:t>resource</a:t>
-            </a:r>
-            <a:r>
-              <a:rPr lang="fr-FR" sz="1800" dirty="0"/>
-              <a:t> </a:t>
-            </a:r>
-            <a:r>
-              <a:rPr lang="fr-FR" sz="1600" dirty="0" err="1"/>
-              <a:t>Todo</a:t>
-            </a:r>
-            <a:r>
-              <a:rPr lang="fr-FR" sz="1800" dirty="0"/>
-              <a:t> dans le </a:t>
-            </a:r>
-            <a:r>
-              <a:rPr lang="fr-FR" sz="1800" dirty="0" err="1"/>
-              <a:t>controller</a:t>
-            </a:r>
-            <a:endParaRPr lang="fr-FR" sz="1200" dirty="0"/>
-          </a:p>
-          <a:p>
-            <a:pPr lvl="0"/>
-            <a:r>
-              <a:rPr lang="fr-FR" sz="1800" dirty="0"/>
-              <a:t>Créer une fonction qui charge la liste </a:t>
-            </a:r>
-            <a:r>
-              <a:rPr lang="fr-FR" sz="1800" dirty="0" err="1"/>
-              <a:t>ds</a:t>
-            </a:r>
-            <a:r>
-              <a:rPr lang="fr-FR" sz="1800" dirty="0"/>
-              <a:t> taches en utilisant la </a:t>
-            </a:r>
-            <a:r>
-              <a:rPr lang="fr-FR" sz="1800" dirty="0" err="1"/>
-              <a:t>resource</a:t>
-            </a:r>
-            <a:r>
-              <a:rPr lang="fr-FR" sz="1800" dirty="0"/>
-              <a:t> </a:t>
-            </a:r>
-            <a:r>
-              <a:rPr lang="fr-FR" sz="1600" dirty="0" err="1"/>
-              <a:t>Todo</a:t>
-            </a:r>
-            <a:endParaRPr lang="fr-FR" sz="1200" dirty="0"/>
-          </a:p>
-          <a:p>
-            <a:pPr lvl="0"/>
-            <a:r>
-              <a:rPr lang="fr-FR" sz="1800" dirty="0"/>
-              <a:t>Modifier la fonction d'ajout de tache pour poster la nouvelle tache au </a:t>
-            </a:r>
-            <a:r>
-              <a:rPr lang="fr-FR" sz="1800" dirty="0" err="1"/>
-              <a:t>backend</a:t>
-            </a:r>
-            <a:endParaRPr lang="fr-FR" sz="1200" dirty="0"/>
-          </a:p>
-          <a:p>
-            <a:pPr lvl="0"/>
-            <a:r>
-              <a:rPr lang="fr-FR" sz="1800" dirty="0"/>
-              <a:t>Modifier la fonction de suppression de tache pour supprimer la </a:t>
-            </a:r>
-            <a:r>
-              <a:rPr lang="fr-FR" sz="1800" dirty="0" smtClean="0"/>
-              <a:t>tache </a:t>
-            </a:r>
-            <a:r>
-              <a:rPr lang="fr-FR" sz="1800" dirty="0"/>
-              <a:t>du </a:t>
-            </a:r>
-            <a:r>
-              <a:rPr lang="fr-FR" sz="1800" dirty="0" err="1"/>
-              <a:t>backend</a:t>
-            </a:r>
-            <a:endParaRPr lang="fr-FR" sz="1200" dirty="0"/>
-          </a:p>
-          <a:p>
-            <a:pPr lvl="0"/>
-            <a:r>
-              <a:rPr lang="fr-FR" sz="1800" dirty="0"/>
-              <a:t>Modifier la fonction de modification d'une tache pour reporter la modification dans le </a:t>
-            </a:r>
-            <a:r>
-              <a:rPr lang="fr-FR" sz="1800" dirty="0" err="1"/>
-              <a:t>backend</a:t>
-            </a:r>
-            <a:endParaRPr lang="fr-FR" sz="1200" dirty="0"/>
-          </a:p>
-        </p:txBody>
-      </p:sp>
-      <p:sp>
-        <p:nvSpPr>
-          <p:cNvPr id="3" name="Titre 2"/>
-          <p:cNvSpPr>
-            <a:spLocks noGrp="1"/>
-          </p:cNvSpPr>
-          <p:nvPr>
-            <p:ph type="title"/>
-          </p:nvPr>
-        </p:nvSpPr>
-        <p:spPr bwMode="gray">
-          <a:xfrm>
-            <a:off x="544439" y="260648"/>
-            <a:ext cx="8045374" cy="332546"/>
-          </a:xfrm>
-        </p:spPr>
-        <p:txBody>
-          <a:bodyPr/>
-          <a:lstStyle/>
-          <a:p>
-            <a:r>
-              <a:rPr lang="fr-FR" dirty="0" smtClean="0"/>
-              <a:t>TP</a:t>
-            </a:r>
-            <a:endParaRPr lang="fr-FR" dirty="0"/>
-          </a:p>
-        </p:txBody>
-      </p:sp>
-      <p:sp>
-        <p:nvSpPr>
-          <p:cNvPr id="5" name="Espace réservé du numéro de diapositive 4"/>
-          <p:cNvSpPr>
-            <a:spLocks noGrp="1"/>
-          </p:cNvSpPr>
-          <p:nvPr>
-            <p:ph type="sldNum" sz="quarter" idx="12"/>
-          </p:nvPr>
-        </p:nvSpPr>
-        <p:spPr bwMode="gray"/>
-        <p:txBody>
-          <a:bodyPr/>
-          <a:lstStyle/>
-          <a:p>
-            <a:fld id="{AF43E6FD-AB27-4108-A2FC-346BB5F75E3F}" type="slidenum">
-              <a:rPr lang="fr-FR" smtClean="0"/>
-              <a:pPr/>
-              <a:t>10</a:t>
-            </a:fld>
-            <a:endParaRPr lang="fr-FR" dirty="0"/>
-          </a:p>
-        </p:txBody>
-      </p:sp>
-      <p:sp>
-        <p:nvSpPr>
-          <p:cNvPr id="10" name="Espace réservé du texte 9"/>
-          <p:cNvSpPr>
-            <a:spLocks noGrp="1"/>
-          </p:cNvSpPr>
-          <p:nvPr>
-            <p:ph type="body" sz="quarter" idx="13"/>
-          </p:nvPr>
-        </p:nvSpPr>
-        <p:spPr bwMode="gray"/>
-        <p:txBody>
-          <a:bodyPr/>
-          <a:lstStyle/>
-          <a:p>
-            <a:r>
-              <a:rPr lang="en-GB" cap="none" dirty="0"/>
-              <a:t>	$resource</a:t>
-            </a:r>
-          </a:p>
-        </p:txBody>
-      </p:sp>
-      <p:sp>
-        <p:nvSpPr>
-          <p:cNvPr id="6" name="Espace réservé du pied de page 5"/>
-          <p:cNvSpPr>
-            <a:spLocks noGrp="1"/>
-          </p:cNvSpPr>
-          <p:nvPr>
-            <p:ph type="ftr" sz="quarter" idx="11"/>
-          </p:nvPr>
-        </p:nvSpPr>
-        <p:spPr/>
-        <p:txBody>
-          <a:bodyPr/>
-          <a:lstStyle/>
-          <a:p>
-            <a:r>
-              <a:rPr lang="fr-FR"/>
-              <a:t>Nom de la présentation</a:t>
-            </a:r>
-            <a:endParaRPr lang="fr-FR" dirty="0"/>
-          </a:p>
-        </p:txBody>
-      </p:sp>
-    </p:spTree>
-    <p:extLst>
-      <p:ext uri="{BB962C8B-B14F-4D97-AF65-F5344CB8AC3E}">
-        <p14:creationId xmlns:p14="http://schemas.microsoft.com/office/powerpoint/2010/main" val="2210043851"/>
-      </p:ext>
-    </p:extLst>
-  </p:cSld>
-  <p:clrMapOvr>
-    <a:masterClrMapping/>
-  </p:clrMapOvr>
-</p:sld>
-</file>
-
 <file path=ppt/slides/slide2.xml><?xml version="1.0" encoding="utf-8"?>
 <p:sld xmlns:a="http://schemas.openxmlformats.org/drawingml/2006/main" xmlns:r="http://schemas.openxmlformats.org/officeDocument/2006/relationships" xmlns:p="http://schemas.openxmlformats.org/presentationml/2006/main">
   <p:cSld>
@@ -11699,11 +11212,7 @@
             </a:pPr>
             <a:r>
               <a:rPr lang="en-US" dirty="0" smtClean="0"/>
-              <a:t>How to identify the item to </a:t>
-            </a:r>
-            <a:r>
-              <a:rPr lang="en-US" dirty="0" smtClean="0"/>
-              <a:t>update?</a:t>
+              <a:t>How to identify the item to update?</a:t>
             </a:r>
             <a:endParaRPr lang="en-US" dirty="0"/>
           </a:p>

</xml_diff>